<commit_message>
Minor mods to ino
</commit_message>
<xml_diff>
--- a/ESP8266FarmClientv2/BoardMap.pptx
+++ b/ESP8266FarmClientv2/BoardMap.pptx
@@ -3498,8 +3498,8 @@
         </p:nvSpPr>
         <p:spPr>
           <a:xfrm flipH="1">
-            <a:off x="933057" y="3749840"/>
-            <a:ext cx="1868251" cy="416703"/>
+            <a:off x="933054" y="3749839"/>
+            <a:ext cx="1868251" cy="1363449"/>
           </a:xfrm>
           <a:prstGeom prst="borderCallout2">
             <a:avLst>
@@ -3507,8 +3507,8 @@
               <a:gd name="adj2" fmla="val -8333"/>
               <a:gd name="adj3" fmla="val 18750"/>
               <a:gd name="adj4" fmla="val -16667"/>
-              <a:gd name="adj5" fmla="val 270287"/>
-              <a:gd name="adj6" fmla="val -106307"/>
+              <a:gd name="adj5" fmla="val 108527"/>
+              <a:gd name="adj6" fmla="val -107166"/>
             </a:avLst>
           </a:prstGeom>
         </p:spPr>
@@ -3535,7 +3535,35 @@
             <a:pPr algn="ctr"/>
             <a:r>
               <a:rPr lang="en-US" sz="1400" dirty="0"/>
-              <a:t>Analog Sensor Input</a:t>
+              <a:t>Multiplexed Analog Sensor Input</a:t>
+            </a:r>
+          </a:p>
+          <a:p>
+            <a:pPr algn="ctr"/>
+            <a:r>
+              <a:rPr lang="en-US" sz="1400" dirty="0"/>
+              <a:t>0=Moisture</a:t>
+            </a:r>
+          </a:p>
+          <a:p>
+            <a:pPr algn="ctr"/>
+            <a:r>
+              <a:rPr lang="en-US" sz="1400" dirty="0"/>
+              <a:t>1=Light</a:t>
+            </a:r>
+          </a:p>
+          <a:p>
+            <a:pPr algn="ctr"/>
+            <a:r>
+              <a:rPr lang="en-US" sz="1400" dirty="0"/>
+              <a:t>2= Sensor Power</a:t>
+            </a:r>
+          </a:p>
+          <a:p>
+            <a:pPr algn="ctr"/>
+            <a:r>
+              <a:rPr lang="en-US" sz="1400" dirty="0"/>
+              <a:t>3=Battery Power</a:t>
             </a:r>
           </a:p>
         </p:txBody>
@@ -3919,7 +3947,7 @@
         </p:nvSpPr>
         <p:spPr>
           <a:xfrm flipH="1">
-            <a:off x="933055" y="5077717"/>
+            <a:off x="933053" y="5398559"/>
             <a:ext cx="1868251" cy="516590"/>
           </a:xfrm>
           <a:prstGeom prst="borderCallout2">
@@ -3928,7 +3956,7 @@
               <a:gd name="adj2" fmla="val -8333"/>
               <a:gd name="adj3" fmla="val 18750"/>
               <a:gd name="adj4" fmla="val -16667"/>
-              <a:gd name="adj5" fmla="val -37695"/>
+              <a:gd name="adj5" fmla="val -90487"/>
               <a:gd name="adj6" fmla="val -122621"/>
             </a:avLst>
           </a:prstGeom>
@@ -4210,16 +4238,68 @@
           <a:p>
             <a:pPr algn="ctr"/>
             <a:r>
-              <a:rPr lang="en-US" sz="1400" dirty="0"/>
-              <a:t>Fans –</a:t>
-            </a:r>
-            <a:r>
-              <a:rPr lang="en-US" sz="1400" dirty="0" err="1"/>
-              <a:t>ve</a:t>
+              <a:rPr lang="en-US" sz="1400"/>
+              <a:t>Fans +ve</a:t>
             </a:r>
             <a:r>
               <a:rPr lang="en-US" sz="1400" dirty="0"/>
               <a:t> (D5)</a:t>
+            </a:r>
+          </a:p>
+        </p:txBody>
+      </p:sp>
+      <p:sp>
+        <p:nvSpPr>
+          <p:cNvPr id="8" name="Callout: Bent Line 7">
+            <a:extLst>
+              <a:ext uri="{FF2B5EF4-FFF2-40B4-BE49-F238E27FC236}">
+                <a16:creationId xmlns:a16="http://schemas.microsoft.com/office/drawing/2014/main" id="{2B2903AB-16B8-4D39-886D-10B48BEB1DCB}"/>
+              </a:ext>
+            </a:extLst>
+          </p:cNvPr>
+          <p:cNvSpPr/>
+          <p:nvPr/>
+        </p:nvSpPr>
+        <p:spPr>
+          <a:xfrm flipH="1">
+            <a:off x="933054" y="1393025"/>
+            <a:ext cx="1868251" cy="516590"/>
+          </a:xfrm>
+          <a:prstGeom prst="borderCallout2">
+            <a:avLst>
+              <a:gd name="adj1" fmla="val 18750"/>
+              <a:gd name="adj2" fmla="val -8333"/>
+              <a:gd name="adj3" fmla="val 18750"/>
+              <a:gd name="adj4" fmla="val -16667"/>
+              <a:gd name="adj5" fmla="val 77775"/>
+              <a:gd name="adj6" fmla="val -114893"/>
+            </a:avLst>
+          </a:prstGeom>
+        </p:spPr>
+        <p:style>
+          <a:lnRef idx="2">
+            <a:schemeClr val="accent1">
+              <a:shade val="50000"/>
+            </a:schemeClr>
+          </a:lnRef>
+          <a:fillRef idx="1">
+            <a:schemeClr val="accent1"/>
+          </a:fillRef>
+          <a:effectRef idx="0">
+            <a:schemeClr val="accent1"/>
+          </a:effectRef>
+          <a:fontRef idx="minor">
+            <a:schemeClr val="lt1"/>
+          </a:fontRef>
+        </p:style>
+        <p:txBody>
+          <a:bodyPr rtlCol="0" anchor="ctr"/>
+          <a:lstStyle/>
+          <a:p>
+            <a:pPr algn="ctr"/>
+            <a:r>
+              <a:rPr lang="en-US" sz="1400" dirty="0"/>
+              <a:t>Multiplexer C3 (Battery Power)</a:t>
             </a:r>
           </a:p>
         </p:txBody>

</xml_diff>